<commit_message>
Made slight enhancements to the doc and ppt files for task 2
</commit_message>
<xml_diff>
--- a/Tasks/FA23BCS117_FA23BCS108_Task2_KNN/FA23BCS117_FA23BCS108_Task2_KNN.pptx
+++ b/Tasks/FA23BCS117_FA23BCS108_Task2_KNN/FA23BCS117_FA23BCS108_Task2_KNN.pptx
@@ -301,7 +301,7 @@
           <a:p>
             <a:fld id="{5BCAD085-E8A6-8845-BD4E-CB4CCA059FC4}" type="datetimeFigureOut">
               <a:rPr lang="en-US" smtClean="0"/>
-              <a:t>9/25/2025</a:t>
+              <a:t>9/27/2025</a:t>
             </a:fld>
             <a:endParaRPr lang="en-US"/>
           </a:p>
@@ -568,7 +568,7 @@
           <a:p>
             <a:fld id="{5BCAD085-E8A6-8845-BD4E-CB4CCA059FC4}" type="datetimeFigureOut">
               <a:rPr lang="en-US" smtClean="0"/>
-              <a:t>9/25/2025</a:t>
+              <a:t>9/27/2025</a:t>
             </a:fld>
             <a:endParaRPr lang="en-US"/>
           </a:p>
@@ -799,7 +799,7 @@
           <a:p>
             <a:fld id="{5BCAD085-E8A6-8845-BD4E-CB4CCA059FC4}" type="datetimeFigureOut">
               <a:rPr lang="en-US" smtClean="0"/>
-              <a:t>9/25/2025</a:t>
+              <a:t>9/27/2025</a:t>
             </a:fld>
             <a:endParaRPr lang="en-US"/>
           </a:p>
@@ -1109,7 +1109,7 @@
           <a:p>
             <a:fld id="{5BCAD085-E8A6-8845-BD4E-CB4CCA059FC4}" type="datetimeFigureOut">
               <a:rPr lang="en-US" smtClean="0"/>
-              <a:t>9/25/2025</a:t>
+              <a:t>9/27/2025</a:t>
             </a:fld>
             <a:endParaRPr lang="en-US"/>
           </a:p>
@@ -1582,7 +1582,7 @@
           <a:p>
             <a:fld id="{5BCAD085-E8A6-8845-BD4E-CB4CCA059FC4}" type="datetimeFigureOut">
               <a:rPr lang="en-US" smtClean="0"/>
-              <a:t>9/25/2025</a:t>
+              <a:t>9/27/2025</a:t>
             </a:fld>
             <a:endParaRPr lang="en-US"/>
           </a:p>
@@ -2129,7 +2129,7 @@
           <a:p>
             <a:fld id="{5BCAD085-E8A6-8845-BD4E-CB4CCA059FC4}" type="datetimeFigureOut">
               <a:rPr lang="en-US" smtClean="0"/>
-              <a:t>9/25/2025</a:t>
+              <a:t>9/27/2025</a:t>
             </a:fld>
             <a:endParaRPr lang="en-US"/>
           </a:p>
@@ -2903,7 +2903,7 @@
           <a:p>
             <a:fld id="{5BCAD085-E8A6-8845-BD4E-CB4CCA059FC4}" type="datetimeFigureOut">
               <a:rPr lang="en-US" smtClean="0"/>
-              <a:t>9/25/2025</a:t>
+              <a:t>9/27/2025</a:t>
             </a:fld>
             <a:endParaRPr lang="en-US"/>
           </a:p>
@@ -3078,7 +3078,7 @@
           <a:p>
             <a:fld id="{5BCAD085-E8A6-8845-BD4E-CB4CCA059FC4}" type="datetimeFigureOut">
               <a:rPr lang="en-US" smtClean="0"/>
-              <a:t>9/25/2025</a:t>
+              <a:t>9/27/2025</a:t>
             </a:fld>
             <a:endParaRPr lang="en-US"/>
           </a:p>
@@ -3301,7 +3301,7 @@
           <a:p>
             <a:fld id="{5BCAD085-E8A6-8845-BD4E-CB4CCA059FC4}" type="datetimeFigureOut">
               <a:rPr lang="en-US" smtClean="0"/>
-              <a:t>9/25/2025</a:t>
+              <a:t>9/27/2025</a:t>
             </a:fld>
             <a:endParaRPr lang="en-US"/>
           </a:p>
@@ -3481,7 +3481,7 @@
           <a:p>
             <a:fld id="{5BCAD085-E8A6-8845-BD4E-CB4CCA059FC4}" type="datetimeFigureOut">
               <a:rPr lang="en-US" smtClean="0"/>
-              <a:t>9/25/2025</a:t>
+              <a:t>9/27/2025</a:t>
             </a:fld>
             <a:endParaRPr lang="en-US"/>
           </a:p>
@@ -3770,7 +3770,7 @@
           <a:p>
             <a:fld id="{5BCAD085-E8A6-8845-BD4E-CB4CCA059FC4}" type="datetimeFigureOut">
               <a:rPr lang="en-US" smtClean="0"/>
-              <a:t>9/25/2025</a:t>
+              <a:t>9/27/2025</a:t>
             </a:fld>
             <a:endParaRPr lang="en-US"/>
           </a:p>
@@ -4012,7 +4012,7 @@
           <a:p>
             <a:fld id="{5BCAD085-E8A6-8845-BD4E-CB4CCA059FC4}" type="datetimeFigureOut">
               <a:rPr lang="en-US" smtClean="0"/>
-              <a:t>9/25/2025</a:t>
+              <a:t>9/27/2025</a:t>
             </a:fld>
             <a:endParaRPr lang="en-US"/>
           </a:p>
@@ -4391,7 +4391,7 @@
           <a:p>
             <a:fld id="{5BCAD085-E8A6-8845-BD4E-CB4CCA059FC4}" type="datetimeFigureOut">
               <a:rPr lang="en-US" smtClean="0"/>
-              <a:t>9/25/2025</a:t>
+              <a:t>9/27/2025</a:t>
             </a:fld>
             <a:endParaRPr lang="en-US"/>
           </a:p>
@@ -4509,7 +4509,7 @@
           <a:p>
             <a:fld id="{5BCAD085-E8A6-8845-BD4E-CB4CCA059FC4}" type="datetimeFigureOut">
               <a:rPr lang="en-US" smtClean="0"/>
-              <a:t>9/25/2025</a:t>
+              <a:t>9/27/2025</a:t>
             </a:fld>
             <a:endParaRPr lang="en-US"/>
           </a:p>
@@ -4604,7 +4604,7 @@
           <a:p>
             <a:fld id="{5BCAD085-E8A6-8845-BD4E-CB4CCA059FC4}" type="datetimeFigureOut">
               <a:rPr lang="en-US" smtClean="0"/>
-              <a:t>9/25/2025</a:t>
+              <a:t>9/27/2025</a:t>
             </a:fld>
             <a:endParaRPr lang="en-US"/>
           </a:p>
@@ -4853,7 +4853,7 @@
           <a:p>
             <a:fld id="{5BCAD085-E8A6-8845-BD4E-CB4CCA059FC4}" type="datetimeFigureOut">
               <a:rPr lang="en-US" smtClean="0"/>
-              <a:t>9/25/2025</a:t>
+              <a:t>9/27/2025</a:t>
             </a:fld>
             <a:endParaRPr lang="en-US"/>
           </a:p>
@@ -5110,7 +5110,7 @@
           <a:p>
             <a:fld id="{5BCAD085-E8A6-8845-BD4E-CB4CCA059FC4}" type="datetimeFigureOut">
               <a:rPr lang="en-US" smtClean="0"/>
-              <a:t>9/25/2025</a:t>
+              <a:t>9/27/2025</a:t>
             </a:fld>
             <a:endParaRPr lang="en-US"/>
           </a:p>
@@ -5353,7 +5353,7 @@
           <a:p>
             <a:fld id="{5BCAD085-E8A6-8845-BD4E-CB4CCA059FC4}" type="datetimeFigureOut">
               <a:rPr lang="en-US" smtClean="0"/>
-              <a:t>9/25/2025</a:t>
+              <a:t>9/27/2025</a:t>
             </a:fld>
             <a:endParaRPr lang="en-US"/>
           </a:p>
@@ -6572,7 +6572,7 @@
         </p:nvSpPr>
         <p:spPr>
           <a:xfrm>
-            <a:off x="902373" y="5774202"/>
+            <a:off x="1960891" y="5734445"/>
             <a:ext cx="7855547" cy="369332"/>
           </a:xfrm>
           <a:prstGeom prst="rect">

</xml_diff>